<commit_message>
Added examples and small fixes to lecture 1.
</commit_message>
<xml_diff>
--- a/slides/img/approaches.pptx
+++ b/slides/img/approaches.pptx
@@ -8,6 +8,7 @@
     <p:sldId id="256" r:id="rId2"/>
     <p:sldId id="257" r:id="rId3"/>
     <p:sldId id="258" r:id="rId4"/>
+    <p:sldId id="259" r:id="rId5"/>
   </p:sldIdLst>
   <p:sldSz cx="12192000" cy="6858000"/>
   <p:notesSz cx="6858000" cy="9144000"/>
@@ -272,7 +273,7 @@
           <a:p>
             <a:fld id="{CDF5438E-8328-FD47-AB6C-7BC1D9D14C52}" type="datetimeFigureOut">
               <a:rPr lang="en-US" smtClean="0"/>
-              <a:t>10/23/23</a:t>
+              <a:t>10/25/23</a:t>
             </a:fld>
             <a:endParaRPr lang="en-US"/>
           </a:p>
@@ -470,7 +471,7 @@
           <a:p>
             <a:fld id="{CDF5438E-8328-FD47-AB6C-7BC1D9D14C52}" type="datetimeFigureOut">
               <a:rPr lang="en-US" smtClean="0"/>
-              <a:t>10/23/23</a:t>
+              <a:t>10/25/23</a:t>
             </a:fld>
             <a:endParaRPr lang="en-US"/>
           </a:p>
@@ -678,7 +679,7 @@
           <a:p>
             <a:fld id="{CDF5438E-8328-FD47-AB6C-7BC1D9D14C52}" type="datetimeFigureOut">
               <a:rPr lang="en-US" smtClean="0"/>
-              <a:t>10/23/23</a:t>
+              <a:t>10/25/23</a:t>
             </a:fld>
             <a:endParaRPr lang="en-US"/>
           </a:p>
@@ -876,7 +877,7 @@
           <a:p>
             <a:fld id="{CDF5438E-8328-FD47-AB6C-7BC1D9D14C52}" type="datetimeFigureOut">
               <a:rPr lang="en-US" smtClean="0"/>
-              <a:t>10/23/23</a:t>
+              <a:t>10/25/23</a:t>
             </a:fld>
             <a:endParaRPr lang="en-US"/>
           </a:p>
@@ -1151,7 +1152,7 @@
           <a:p>
             <a:fld id="{CDF5438E-8328-FD47-AB6C-7BC1D9D14C52}" type="datetimeFigureOut">
               <a:rPr lang="en-US" smtClean="0"/>
-              <a:t>10/23/23</a:t>
+              <a:t>10/25/23</a:t>
             </a:fld>
             <a:endParaRPr lang="en-US"/>
           </a:p>
@@ -1416,7 +1417,7 @@
           <a:p>
             <a:fld id="{CDF5438E-8328-FD47-AB6C-7BC1D9D14C52}" type="datetimeFigureOut">
               <a:rPr lang="en-US" smtClean="0"/>
-              <a:t>10/23/23</a:t>
+              <a:t>10/25/23</a:t>
             </a:fld>
             <a:endParaRPr lang="en-US"/>
           </a:p>
@@ -1828,7 +1829,7 @@
           <a:p>
             <a:fld id="{CDF5438E-8328-FD47-AB6C-7BC1D9D14C52}" type="datetimeFigureOut">
               <a:rPr lang="en-US" smtClean="0"/>
-              <a:t>10/23/23</a:t>
+              <a:t>10/25/23</a:t>
             </a:fld>
             <a:endParaRPr lang="en-US"/>
           </a:p>
@@ -1969,7 +1970,7 @@
           <a:p>
             <a:fld id="{CDF5438E-8328-FD47-AB6C-7BC1D9D14C52}" type="datetimeFigureOut">
               <a:rPr lang="en-US" smtClean="0"/>
-              <a:t>10/23/23</a:t>
+              <a:t>10/25/23</a:t>
             </a:fld>
             <a:endParaRPr lang="en-US"/>
           </a:p>
@@ -2082,7 +2083,7 @@
           <a:p>
             <a:fld id="{CDF5438E-8328-FD47-AB6C-7BC1D9D14C52}" type="datetimeFigureOut">
               <a:rPr lang="en-US" smtClean="0"/>
-              <a:t>10/23/23</a:t>
+              <a:t>10/25/23</a:t>
             </a:fld>
             <a:endParaRPr lang="en-US"/>
           </a:p>
@@ -2393,7 +2394,7 @@
           <a:p>
             <a:fld id="{CDF5438E-8328-FD47-AB6C-7BC1D9D14C52}" type="datetimeFigureOut">
               <a:rPr lang="en-US" smtClean="0"/>
-              <a:t>10/23/23</a:t>
+              <a:t>10/25/23</a:t>
             </a:fld>
             <a:endParaRPr lang="en-US"/>
           </a:p>
@@ -2681,7 +2682,7 @@
           <a:p>
             <a:fld id="{CDF5438E-8328-FD47-AB6C-7BC1D9D14C52}" type="datetimeFigureOut">
               <a:rPr lang="en-US" smtClean="0"/>
-              <a:t>10/23/23</a:t>
+              <a:t>10/25/23</a:t>
             </a:fld>
             <a:endParaRPr lang="en-US"/>
           </a:p>
@@ -2922,7 +2923,7 @@
           <a:p>
             <a:fld id="{CDF5438E-8328-FD47-AB6C-7BC1D9D14C52}" type="datetimeFigureOut">
               <a:rPr lang="en-US" smtClean="0"/>
-              <a:t>10/23/23</a:t>
+              <a:t>10/25/23</a:t>
             </a:fld>
             <a:endParaRPr lang="en-US"/>
           </a:p>
@@ -14544,6 +14545,866 @@
 </p:sld>
 </file>
 
+<file path=ppt/slides/slide4.xml><?xml version="1.0" encoding="utf-8"?>
+<p:sld xmlns:a="http://schemas.openxmlformats.org/drawingml/2006/main" xmlns:r="http://schemas.openxmlformats.org/officeDocument/2006/relationships" xmlns:p="http://schemas.openxmlformats.org/presentationml/2006/main">
+  <p:cSld>
+    <p:spTree>
+      <p:nvGrpSpPr>
+        <p:cNvPr id="1" name=""/>
+        <p:cNvGrpSpPr/>
+        <p:nvPr/>
+      </p:nvGrpSpPr>
+      <p:grpSpPr>
+        <a:xfrm>
+          <a:off x="0" y="0"/>
+          <a:ext cx="0" cy="0"/>
+          <a:chOff x="0" y="0"/>
+          <a:chExt cx="0" cy="0"/>
+        </a:xfrm>
+      </p:grpSpPr>
+      <p:graphicFrame>
+        <p:nvGraphicFramePr>
+          <p:cNvPr id="4" name="Table 3">
+            <a:extLst>
+              <a:ext uri="{FF2B5EF4-FFF2-40B4-BE49-F238E27FC236}">
+                <a16:creationId xmlns:a16="http://schemas.microsoft.com/office/drawing/2014/main" id="{BF27864A-AD4F-2F46-A8CC-C2B38A0DEEB1}"/>
+              </a:ext>
+            </a:extLst>
+          </p:cNvPr>
+          <p:cNvGraphicFramePr>
+            <a:graphicFrameLocks noGrp="1"/>
+          </p:cNvGraphicFramePr>
+          <p:nvPr>
+            <p:extLst>
+              <p:ext uri="{D42A27DB-BD31-4B8C-83A1-F6EECF244321}">
+                <p14:modId xmlns:p14="http://schemas.microsoft.com/office/powerpoint/2010/main" val="1297891647"/>
+              </p:ext>
+            </p:extLst>
+          </p:nvPr>
+        </p:nvGraphicFramePr>
+        <p:xfrm>
+          <a:off x="89963" y="290830"/>
+          <a:ext cx="12012073" cy="6162040"/>
+        </p:xfrm>
+        <a:graphic>
+          <a:graphicData uri="http://schemas.openxmlformats.org/drawingml/2006/table">
+            <a:tbl>
+              <a:tblPr firstRow="1" bandRow="1">
+                <a:tableStyleId>{5C22544A-7EE6-4342-B048-85BDC9FD1C3A}</a:tableStyleId>
+              </a:tblPr>
+              <a:tblGrid>
+                <a:gridCol w="434973">
+                  <a:extLst>
+                    <a:ext uri="{9D8B030D-6E8A-4147-A177-3AD203B41FA5}">
+                      <a16:colId xmlns:a16="http://schemas.microsoft.com/office/drawing/2014/main" val="3770098580"/>
+                    </a:ext>
+                  </a:extLst>
+                </a:gridCol>
+                <a:gridCol w="2273923">
+                  <a:extLst>
+                    <a:ext uri="{9D8B030D-6E8A-4147-A177-3AD203B41FA5}">
+                      <a16:colId xmlns:a16="http://schemas.microsoft.com/office/drawing/2014/main" val="2822803055"/>
+                    </a:ext>
+                  </a:extLst>
+                </a:gridCol>
+                <a:gridCol w="9303177">
+                  <a:extLst>
+                    <a:ext uri="{9D8B030D-6E8A-4147-A177-3AD203B41FA5}">
+                      <a16:colId xmlns:a16="http://schemas.microsoft.com/office/drawing/2014/main" val="190540705"/>
+                    </a:ext>
+                  </a:extLst>
+                </a:gridCol>
+              </a:tblGrid>
+              <a:tr h="370840">
+                <a:tc>
+                  <a:txBody>
+                    <a:bodyPr/>
+                    <a:lstStyle/>
+                    <a:p>
+                      <a:r>
+                        <a:rPr lang="en-US" sz="1400" dirty="0">
+                          <a:latin typeface="Roboto Condensed" panose="02000000000000000000" pitchFamily="2" charset="0"/>
+                          <a:ea typeface="Roboto Condensed" panose="02000000000000000000" pitchFamily="2" charset="0"/>
+                        </a:rPr>
+                        <a:t>#</a:t>
+                      </a:r>
+                    </a:p>
+                  </a:txBody>
+                  <a:tcPr/>
+                </a:tc>
+                <a:tc>
+                  <a:txBody>
+                    <a:bodyPr/>
+                    <a:lstStyle/>
+                    <a:p>
+                      <a:r>
+                        <a:rPr lang="en-US" sz="1400" dirty="0">
+                          <a:latin typeface="Roboto Condensed" panose="02000000000000000000" pitchFamily="2" charset="0"/>
+                          <a:ea typeface="Roboto Condensed" panose="02000000000000000000" pitchFamily="2" charset="0"/>
+                        </a:rPr>
+                        <a:t>Principle</a:t>
+                      </a:r>
+                    </a:p>
+                  </a:txBody>
+                  <a:tcPr/>
+                </a:tc>
+                <a:tc>
+                  <a:txBody>
+                    <a:bodyPr/>
+                    <a:lstStyle/>
+                    <a:p>
+                      <a:r>
+                        <a:rPr lang="en-US" sz="1400" dirty="0">
+                          <a:latin typeface="Roboto Condensed" panose="02000000000000000000" pitchFamily="2" charset="0"/>
+                          <a:ea typeface="Roboto Condensed" panose="02000000000000000000" pitchFamily="2" charset="0"/>
+                        </a:rPr>
+                        <a:t>Important aspects</a:t>
+                      </a:r>
+                    </a:p>
+                  </a:txBody>
+                  <a:tcPr/>
+                </a:tc>
+                <a:extLst>
+                  <a:ext uri="{0D108BD9-81ED-4DB2-BD59-A6C34878D82A}">
+                    <a16:rowId xmlns:a16="http://schemas.microsoft.com/office/drawing/2014/main" val="2748719694"/>
+                  </a:ext>
+                </a:extLst>
+              </a:tr>
+              <a:tr h="370840">
+                <a:tc>
+                  <a:txBody>
+                    <a:bodyPr/>
+                    <a:lstStyle/>
+                    <a:p>
+                      <a:r>
+                        <a:rPr lang="en-US" sz="1400" dirty="0">
+                          <a:solidFill>
+                            <a:schemeClr val="tx1">
+                              <a:lumMod val="85000"/>
+                              <a:lumOff val="15000"/>
+                            </a:schemeClr>
+                          </a:solidFill>
+                          <a:latin typeface="Roboto Condensed" panose="02000000000000000000" pitchFamily="2" charset="0"/>
+                          <a:ea typeface="Roboto Condensed" panose="02000000000000000000" pitchFamily="2" charset="0"/>
+                        </a:rPr>
+                        <a:t>1.</a:t>
+                      </a:r>
+                    </a:p>
+                  </a:txBody>
+                  <a:tcPr/>
+                </a:tc>
+                <a:tc>
+                  <a:txBody>
+                    <a:bodyPr/>
+                    <a:lstStyle/>
+                    <a:p>
+                      <a:r>
+                        <a:rPr lang="en-US" sz="1400" b="1" dirty="0">
+                          <a:solidFill>
+                            <a:schemeClr val="tx1">
+                              <a:lumMod val="85000"/>
+                              <a:lumOff val="15000"/>
+                            </a:schemeClr>
+                          </a:solidFill>
+                          <a:latin typeface="Roboto Condensed" panose="02000000000000000000" pitchFamily="2" charset="0"/>
+                          <a:ea typeface="Roboto Condensed" panose="02000000000000000000" pitchFamily="2" charset="0"/>
+                        </a:rPr>
+                        <a:t>Ensure privacy and data security</a:t>
+                      </a:r>
+                    </a:p>
+                  </a:txBody>
+                  <a:tcPr/>
+                </a:tc>
+                <a:tc>
+                  <a:txBody>
+                    <a:bodyPr/>
+                    <a:lstStyle/>
+                    <a:p>
+                      <a:pPr marL="285750" indent="-285750">
+                        <a:spcAft>
+                          <a:spcPts val="600"/>
+                        </a:spcAft>
+                        <a:buFont typeface="Arial" panose="020B0604020202020204" pitchFamily="34" charset="0"/>
+                        <a:buChar char="•"/>
+                      </a:pPr>
+                      <a:r>
+                        <a:rPr lang="en-US" sz="1400" dirty="0">
+                          <a:solidFill>
+                            <a:schemeClr val="tx1">
+                              <a:lumMod val="85000"/>
+                              <a:lumOff val="15000"/>
+                            </a:schemeClr>
+                          </a:solidFill>
+                          <a:latin typeface="Roboto Condensed" panose="02000000000000000000" pitchFamily="2" charset="0"/>
+                          <a:ea typeface="Roboto Condensed" panose="02000000000000000000" pitchFamily="2" charset="0"/>
+                        </a:rPr>
+                        <a:t>Prioritize informed consent and data privacy, if possible obtain permission for data use. </a:t>
+                      </a:r>
+                    </a:p>
+                    <a:p>
+                      <a:pPr marL="285750" indent="-285750">
+                        <a:spcAft>
+                          <a:spcPts val="600"/>
+                        </a:spcAft>
+                        <a:buFont typeface="Arial" panose="020B0604020202020204" pitchFamily="34" charset="0"/>
+                        <a:buChar char="•"/>
+                      </a:pPr>
+                      <a:r>
+                        <a:rPr lang="en-US" sz="1400" dirty="0">
+                          <a:solidFill>
+                            <a:schemeClr val="tx1">
+                              <a:lumMod val="85000"/>
+                              <a:lumOff val="15000"/>
+                            </a:schemeClr>
+                          </a:solidFill>
+                          <a:latin typeface="Roboto Condensed" panose="02000000000000000000" pitchFamily="2" charset="0"/>
+                          <a:ea typeface="Roboto Condensed" panose="02000000000000000000" pitchFamily="2" charset="0"/>
+                        </a:rPr>
+                        <a:t>Most importantly, ensure the protection of individuals' sensitive information via strict data management and protection rules</a:t>
+                      </a:r>
+                    </a:p>
+                    <a:p>
+                      <a:pPr marL="285750" indent="-285750">
+                        <a:spcAft>
+                          <a:spcPts val="600"/>
+                        </a:spcAft>
+                        <a:buFont typeface="Arial" panose="020B0604020202020204" pitchFamily="34" charset="0"/>
+                        <a:buChar char="•"/>
+                      </a:pPr>
+                      <a:r>
+                        <a:rPr lang="en-US" sz="1400" dirty="0">
+                          <a:solidFill>
+                            <a:schemeClr val="tx1">
+                              <a:lumMod val="85000"/>
+                              <a:lumOff val="15000"/>
+                            </a:schemeClr>
+                          </a:solidFill>
+                          <a:latin typeface="Roboto Condensed" panose="02000000000000000000" pitchFamily="2" charset="0"/>
+                          <a:ea typeface="Roboto Condensed" panose="02000000000000000000" pitchFamily="2" charset="0"/>
+                        </a:rPr>
+                        <a:t>When using proprietary software and algorithms, consider risks of sharing subject data with the companies operating them (e.g., </a:t>
+                      </a:r>
+                      <a:r>
+                        <a:rPr lang="en-US" sz="1400" dirty="0" err="1">
+                          <a:solidFill>
+                            <a:schemeClr val="tx1">
+                              <a:lumMod val="85000"/>
+                              <a:lumOff val="15000"/>
+                            </a:schemeClr>
+                          </a:solidFill>
+                          <a:latin typeface="Roboto Condensed" panose="02000000000000000000" pitchFamily="2" charset="0"/>
+                          <a:ea typeface="Roboto Condensed" panose="02000000000000000000" pitchFamily="2" charset="0"/>
+                        </a:rPr>
+                        <a:t>OpenAI</a:t>
+                      </a:r>
+                      <a:r>
+                        <a:rPr lang="en-US" sz="1400" dirty="0">
+                          <a:solidFill>
+                            <a:schemeClr val="tx1">
+                              <a:lumMod val="85000"/>
+                              <a:lumOff val="15000"/>
+                            </a:schemeClr>
+                          </a:solidFill>
+                          <a:latin typeface="Roboto Condensed" panose="02000000000000000000" pitchFamily="2" charset="0"/>
+                          <a:ea typeface="Roboto Condensed" panose="02000000000000000000" pitchFamily="2" charset="0"/>
+                        </a:rPr>
+                        <a:t>, Google, etc.)</a:t>
+                      </a:r>
+                    </a:p>
+                  </a:txBody>
+                  <a:tcPr/>
+                </a:tc>
+                <a:extLst>
+                  <a:ext uri="{0D108BD9-81ED-4DB2-BD59-A6C34878D82A}">
+                    <a16:rowId xmlns:a16="http://schemas.microsoft.com/office/drawing/2014/main" val="1323100643"/>
+                  </a:ext>
+                </a:extLst>
+              </a:tr>
+              <a:tr h="370840">
+                <a:tc>
+                  <a:txBody>
+                    <a:bodyPr/>
+                    <a:lstStyle/>
+                    <a:p>
+                      <a:r>
+                        <a:rPr lang="en-US" sz="1400" dirty="0">
+                          <a:solidFill>
+                            <a:schemeClr val="tx1">
+                              <a:lumMod val="85000"/>
+                              <a:lumOff val="15000"/>
+                            </a:schemeClr>
+                          </a:solidFill>
+                          <a:latin typeface="Roboto Condensed" panose="02000000000000000000" pitchFamily="2" charset="0"/>
+                          <a:ea typeface="Roboto Condensed" panose="02000000000000000000" pitchFamily="2" charset="0"/>
+                        </a:rPr>
+                        <a:t>2. </a:t>
+                      </a:r>
+                    </a:p>
+                  </a:txBody>
+                  <a:tcPr/>
+                </a:tc>
+                <a:tc>
+                  <a:txBody>
+                    <a:bodyPr/>
+                    <a:lstStyle/>
+                    <a:p>
+                      <a:r>
+                        <a:rPr lang="en-US" sz="1400" b="1" dirty="0">
+                          <a:solidFill>
+                            <a:schemeClr val="tx1">
+                              <a:lumMod val="85000"/>
+                              <a:lumOff val="15000"/>
+                            </a:schemeClr>
+                          </a:solidFill>
+                          <a:latin typeface="Roboto Condensed" panose="02000000000000000000" pitchFamily="2" charset="0"/>
+                          <a:ea typeface="Roboto Condensed" panose="02000000000000000000" pitchFamily="2" charset="0"/>
+                        </a:rPr>
+                        <a:t>Prevent bias and ensure fairness</a:t>
+                      </a:r>
+                    </a:p>
+                  </a:txBody>
+                  <a:tcPr/>
+                </a:tc>
+                <a:tc>
+                  <a:txBody>
+                    <a:bodyPr/>
+                    <a:lstStyle/>
+                    <a:p>
+                      <a:pPr marL="285750" indent="-285750">
+                        <a:spcAft>
+                          <a:spcPts val="600"/>
+                        </a:spcAft>
+                        <a:buFont typeface="Arial" panose="020B0604020202020204" pitchFamily="34" charset="0"/>
+                        <a:buChar char="•"/>
+                      </a:pPr>
+                      <a:r>
+                        <a:rPr lang="en-US" sz="1400" dirty="0">
+                          <a:solidFill>
+                            <a:schemeClr val="tx1">
+                              <a:lumMod val="85000"/>
+                              <a:lumOff val="15000"/>
+                            </a:schemeClr>
+                          </a:solidFill>
+                          <a:latin typeface="Roboto Condensed" panose="02000000000000000000" pitchFamily="2" charset="0"/>
+                          <a:ea typeface="Roboto Condensed" panose="02000000000000000000" pitchFamily="2" charset="0"/>
+                        </a:rPr>
+                        <a:t>Ensure that text classification models are designed to be fair, with strategies in place to identify and mitigate biases in the data and algorithms. </a:t>
+                      </a:r>
+                    </a:p>
+                    <a:p>
+                      <a:pPr marL="285750" indent="-285750">
+                        <a:spcAft>
+                          <a:spcPts val="600"/>
+                        </a:spcAft>
+                        <a:buFont typeface="Arial" panose="020B0604020202020204" pitchFamily="34" charset="0"/>
+                        <a:buChar char="•"/>
+                      </a:pPr>
+                      <a:r>
+                        <a:rPr lang="en-US" sz="1400" dirty="0">
+                          <a:solidFill>
+                            <a:schemeClr val="tx1">
+                              <a:lumMod val="85000"/>
+                              <a:lumOff val="15000"/>
+                            </a:schemeClr>
+                          </a:solidFill>
+                          <a:latin typeface="Roboto Condensed" panose="02000000000000000000" pitchFamily="2" charset="0"/>
+                          <a:ea typeface="Roboto Condensed" panose="02000000000000000000" pitchFamily="2" charset="0"/>
+                        </a:rPr>
+                        <a:t>Regularly assess the performance of text classification models and be committed to refining them to enhance accuracy and fairness. Overall, put a strong emphasis on validation!</a:t>
+                      </a:r>
+                    </a:p>
+                  </a:txBody>
+                  <a:tcPr/>
+                </a:tc>
+                <a:extLst>
+                  <a:ext uri="{0D108BD9-81ED-4DB2-BD59-A6C34878D82A}">
+                    <a16:rowId xmlns:a16="http://schemas.microsoft.com/office/drawing/2014/main" val="2173092153"/>
+                  </a:ext>
+                </a:extLst>
+              </a:tr>
+              <a:tr h="370840">
+                <a:tc>
+                  <a:txBody>
+                    <a:bodyPr/>
+                    <a:lstStyle/>
+                    <a:p>
+                      <a:r>
+                        <a:rPr lang="en-US" sz="1400" dirty="0">
+                          <a:solidFill>
+                            <a:schemeClr val="tx1">
+                              <a:lumMod val="85000"/>
+                              <a:lumOff val="15000"/>
+                            </a:schemeClr>
+                          </a:solidFill>
+                          <a:latin typeface="Roboto Condensed" panose="02000000000000000000" pitchFamily="2" charset="0"/>
+                          <a:ea typeface="Roboto Condensed" panose="02000000000000000000" pitchFamily="2" charset="0"/>
+                        </a:rPr>
+                        <a:t>3. </a:t>
+                      </a:r>
+                    </a:p>
+                  </a:txBody>
+                  <a:tcPr/>
+                </a:tc>
+                <a:tc>
+                  <a:txBody>
+                    <a:bodyPr/>
+                    <a:lstStyle/>
+                    <a:p>
+                      <a:r>
+                        <a:rPr lang="en-US" sz="1400" b="1" dirty="0">
+                          <a:solidFill>
+                            <a:schemeClr val="tx1">
+                              <a:lumMod val="85000"/>
+                              <a:lumOff val="15000"/>
+                            </a:schemeClr>
+                          </a:solidFill>
+                          <a:latin typeface="Roboto Condensed" panose="02000000000000000000" pitchFamily="2" charset="0"/>
+                          <a:ea typeface="Roboto Condensed" panose="02000000000000000000" pitchFamily="2" charset="0"/>
+                        </a:rPr>
+                        <a:t>Strive for transparency</a:t>
+                      </a:r>
+                    </a:p>
+                  </a:txBody>
+                  <a:tcPr/>
+                </a:tc>
+                <a:tc>
+                  <a:txBody>
+                    <a:bodyPr/>
+                    <a:lstStyle/>
+                    <a:p>
+                      <a:pPr marL="285750" indent="-285750">
+                        <a:spcAft>
+                          <a:spcPts val="600"/>
+                        </a:spcAft>
+                        <a:buFont typeface="Arial" panose="020B0604020202020204" pitchFamily="34" charset="0"/>
+                        <a:buChar char="•"/>
+                      </a:pPr>
+                      <a:r>
+                        <a:rPr lang="en-US" sz="1400" dirty="0">
+                          <a:solidFill>
+                            <a:schemeClr val="tx1">
+                              <a:lumMod val="85000"/>
+                              <a:lumOff val="15000"/>
+                            </a:schemeClr>
+                          </a:solidFill>
+                          <a:latin typeface="Roboto Condensed" panose="02000000000000000000" pitchFamily="2" charset="0"/>
+                          <a:ea typeface="Roboto Condensed" panose="02000000000000000000" pitchFamily="2" charset="0"/>
+                        </a:rPr>
+                        <a:t>Use transparent and interpretable text classification models if possible, allowing users to understand how decisions are made and to address concerns regarding model opacity. </a:t>
+                      </a:r>
+                    </a:p>
+                    <a:p>
+                      <a:pPr marL="285750" indent="-285750">
+                        <a:spcAft>
+                          <a:spcPts val="600"/>
+                        </a:spcAft>
+                        <a:buFont typeface="Arial" panose="020B0604020202020204" pitchFamily="34" charset="0"/>
+                        <a:buChar char="•"/>
+                      </a:pPr>
+                      <a:r>
+                        <a:rPr lang="en-US" sz="1400" dirty="0">
+                          <a:solidFill>
+                            <a:schemeClr val="tx1">
+                              <a:lumMod val="85000"/>
+                              <a:lumOff val="15000"/>
+                            </a:schemeClr>
+                          </a:solidFill>
+                          <a:latin typeface="Roboto Condensed" panose="02000000000000000000" pitchFamily="2" charset="0"/>
+                          <a:ea typeface="Roboto Condensed" panose="02000000000000000000" pitchFamily="2" charset="0"/>
+                        </a:rPr>
+                        <a:t>Share more complex models for re-use and evaluation.</a:t>
+                      </a:r>
+                    </a:p>
+                  </a:txBody>
+                  <a:tcPr/>
+                </a:tc>
+                <a:extLst>
+                  <a:ext uri="{0D108BD9-81ED-4DB2-BD59-A6C34878D82A}">
+                    <a16:rowId xmlns:a16="http://schemas.microsoft.com/office/drawing/2014/main" val="2631507762"/>
+                  </a:ext>
+                </a:extLst>
+              </a:tr>
+              <a:tr h="370840">
+                <a:tc>
+                  <a:txBody>
+                    <a:bodyPr/>
+                    <a:lstStyle/>
+                    <a:p>
+                      <a:r>
+                        <a:rPr lang="en-US" sz="1400" dirty="0">
+                          <a:solidFill>
+                            <a:schemeClr val="tx1">
+                              <a:lumMod val="85000"/>
+                              <a:lumOff val="15000"/>
+                            </a:schemeClr>
+                          </a:solidFill>
+                          <a:latin typeface="Roboto Condensed" panose="02000000000000000000" pitchFamily="2" charset="0"/>
+                          <a:ea typeface="Roboto Condensed" panose="02000000000000000000" pitchFamily="2" charset="0"/>
+                        </a:rPr>
+                        <a:t>4. </a:t>
+                      </a:r>
+                    </a:p>
+                  </a:txBody>
+                  <a:tcPr/>
+                </a:tc>
+                <a:tc>
+                  <a:txBody>
+                    <a:bodyPr/>
+                    <a:lstStyle/>
+                    <a:p>
+                      <a:r>
+                        <a:rPr lang="en-US" sz="1400" b="1" dirty="0">
+                          <a:solidFill>
+                            <a:schemeClr val="tx1">
+                              <a:lumMod val="85000"/>
+                              <a:lumOff val="15000"/>
+                            </a:schemeClr>
+                          </a:solidFill>
+                          <a:latin typeface="Roboto Condensed" panose="02000000000000000000" pitchFamily="2" charset="0"/>
+                          <a:ea typeface="Roboto Condensed" panose="02000000000000000000" pitchFamily="2" charset="0"/>
+                        </a:rPr>
+                        <a:t>Be mindful about conducting social experiments</a:t>
+                      </a:r>
+                    </a:p>
+                  </a:txBody>
+                  <a:tcPr/>
+                </a:tc>
+                <a:tc>
+                  <a:txBody>
+                    <a:bodyPr/>
+                    <a:lstStyle/>
+                    <a:p>
+                      <a:pPr marL="285750" indent="-285750">
+                        <a:spcAft>
+                          <a:spcPts val="600"/>
+                        </a:spcAft>
+                        <a:buFont typeface="Arial" panose="020B0604020202020204" pitchFamily="34" charset="0"/>
+                        <a:buChar char="•"/>
+                      </a:pPr>
+                      <a:r>
+                        <a:rPr lang="en-US" sz="1400" dirty="0">
+                          <a:solidFill>
+                            <a:schemeClr val="tx1">
+                              <a:lumMod val="85000"/>
+                              <a:lumOff val="15000"/>
+                            </a:schemeClr>
+                          </a:solidFill>
+                          <a:latin typeface="Roboto Condensed" panose="02000000000000000000" pitchFamily="2" charset="0"/>
+                          <a:ea typeface="Roboto Condensed" panose="02000000000000000000" pitchFamily="2" charset="0"/>
+                        </a:rPr>
+                        <a:t>If possible, obtain informed consent and ensure thorough debriefing</a:t>
+                      </a:r>
+                    </a:p>
+                    <a:p>
+                      <a:pPr marL="285750" indent="-285750">
+                        <a:spcAft>
+                          <a:spcPts val="600"/>
+                        </a:spcAft>
+                        <a:buFont typeface="Arial" panose="020B0604020202020204" pitchFamily="34" charset="0"/>
+                        <a:buChar char="•"/>
+                      </a:pPr>
+                      <a:r>
+                        <a:rPr lang="en-US" sz="1400" dirty="0">
+                          <a:solidFill>
+                            <a:schemeClr val="tx1">
+                              <a:lumMod val="85000"/>
+                              <a:lumOff val="15000"/>
+                            </a:schemeClr>
+                          </a:solidFill>
+                          <a:latin typeface="Roboto Condensed" panose="02000000000000000000" pitchFamily="2" charset="0"/>
+                          <a:ea typeface="Roboto Condensed" panose="02000000000000000000" pitchFamily="2" charset="0"/>
+                        </a:rPr>
+                        <a:t>If that is not possible or undesired, thoroughly assess potential negative consequences of the study.  Only if they are acceptable or not different from everyday use of technology, the study may be ethical to conduct (think about psychological consequences, discrimination, political implications…)</a:t>
+                      </a:r>
+                    </a:p>
+                  </a:txBody>
+                  <a:tcPr/>
+                </a:tc>
+                <a:extLst>
+                  <a:ext uri="{0D108BD9-81ED-4DB2-BD59-A6C34878D82A}">
+                    <a16:rowId xmlns:a16="http://schemas.microsoft.com/office/drawing/2014/main" val="1835604108"/>
+                  </a:ext>
+                </a:extLst>
+              </a:tr>
+              <a:tr h="370840">
+                <a:tc>
+                  <a:txBody>
+                    <a:bodyPr/>
+                    <a:lstStyle/>
+                    <a:p>
+                      <a:r>
+                        <a:rPr lang="en-US" sz="1400" dirty="0">
+                          <a:solidFill>
+                            <a:schemeClr val="tx1">
+                              <a:lumMod val="85000"/>
+                              <a:lumOff val="15000"/>
+                            </a:schemeClr>
+                          </a:solidFill>
+                          <a:latin typeface="Roboto Condensed" panose="02000000000000000000" pitchFamily="2" charset="0"/>
+                          <a:ea typeface="Roboto Condensed" panose="02000000000000000000" pitchFamily="2" charset="0"/>
+                        </a:rPr>
+                        <a:t>5. </a:t>
+                      </a:r>
+                    </a:p>
+                  </a:txBody>
+                  <a:tcPr/>
+                </a:tc>
+                <a:tc>
+                  <a:txBody>
+                    <a:bodyPr/>
+                    <a:lstStyle/>
+                    <a:p>
+                      <a:r>
+                        <a:rPr lang="en-US" sz="1400" b="1" dirty="0">
+                          <a:solidFill>
+                            <a:schemeClr val="tx1">
+                              <a:lumMod val="85000"/>
+                              <a:lumOff val="15000"/>
+                            </a:schemeClr>
+                          </a:solidFill>
+                          <a:latin typeface="Roboto Condensed" panose="02000000000000000000" pitchFamily="2" charset="0"/>
+                          <a:ea typeface="Roboto Condensed" panose="02000000000000000000" pitchFamily="2" charset="0"/>
+                        </a:rPr>
+                        <a:t>Reduce environmental impact</a:t>
+                      </a:r>
+                    </a:p>
+                  </a:txBody>
+                  <a:tcPr/>
+                </a:tc>
+                <a:tc>
+                  <a:txBody>
+                    <a:bodyPr/>
+                    <a:lstStyle/>
+                    <a:p>
+                      <a:pPr marL="285750" indent="-285750">
+                        <a:spcAft>
+                          <a:spcPts val="600"/>
+                        </a:spcAft>
+                        <a:buFont typeface="Arial" panose="020B0604020202020204" pitchFamily="34" charset="0"/>
+                        <a:buChar char="•"/>
+                      </a:pPr>
+                      <a:r>
+                        <a:rPr lang="en-US" sz="1400" dirty="0">
+                          <a:solidFill>
+                            <a:schemeClr val="tx1">
+                              <a:lumMod val="85000"/>
+                              <a:lumOff val="15000"/>
+                            </a:schemeClr>
+                          </a:solidFill>
+                          <a:latin typeface="Roboto Condensed" panose="02000000000000000000" pitchFamily="2" charset="0"/>
+                          <a:ea typeface="Roboto Condensed" panose="02000000000000000000" pitchFamily="2" charset="0"/>
+                        </a:rPr>
+                        <a:t>A lot of task do NOT require the use of computationally extensive approaches (e.g., the fine-tuning of large language models); test performance on smaller subsets before wasting energy on using an overly complex approach for a simple task</a:t>
+                      </a:r>
+                    </a:p>
+                    <a:p>
+                      <a:pPr marL="285750" indent="-285750">
+                        <a:spcAft>
+                          <a:spcPts val="600"/>
+                        </a:spcAft>
+                        <a:buFont typeface="Arial" panose="020B0604020202020204" pitchFamily="34" charset="0"/>
+                        <a:buChar char="•"/>
+                      </a:pPr>
+                      <a:r>
+                        <a:rPr lang="en-US" sz="1400" dirty="0">
+                          <a:solidFill>
+                            <a:schemeClr val="tx1">
+                              <a:lumMod val="85000"/>
+                              <a:lumOff val="15000"/>
+                            </a:schemeClr>
+                          </a:solidFill>
+                          <a:latin typeface="Roboto Condensed" panose="02000000000000000000" pitchFamily="2" charset="0"/>
+                          <a:ea typeface="Roboto Condensed" panose="02000000000000000000" pitchFamily="2" charset="0"/>
+                        </a:rPr>
+                        <a:t>Assess the impact of your research: Is it worth using this much energy in light of expected impact?</a:t>
+                      </a:r>
+                    </a:p>
+                  </a:txBody>
+                  <a:tcPr/>
+                </a:tc>
+                <a:extLst>
+                  <a:ext uri="{0D108BD9-81ED-4DB2-BD59-A6C34878D82A}">
+                    <a16:rowId xmlns:a16="http://schemas.microsoft.com/office/drawing/2014/main" val="2129688870"/>
+                  </a:ext>
+                </a:extLst>
+              </a:tr>
+              <a:tr h="370840">
+                <a:tc>
+                  <a:txBody>
+                    <a:bodyPr/>
+                    <a:lstStyle/>
+                    <a:p>
+                      <a:r>
+                        <a:rPr lang="en-US" sz="1400" dirty="0">
+                          <a:solidFill>
+                            <a:schemeClr val="tx1">
+                              <a:lumMod val="85000"/>
+                              <a:lumOff val="15000"/>
+                            </a:schemeClr>
+                          </a:solidFill>
+                          <a:latin typeface="Roboto Condensed" panose="02000000000000000000" pitchFamily="2" charset="0"/>
+                          <a:ea typeface="Roboto Condensed" panose="02000000000000000000" pitchFamily="2" charset="0"/>
+                        </a:rPr>
+                        <a:t>6.</a:t>
+                      </a:r>
+                    </a:p>
+                  </a:txBody>
+                  <a:tcPr/>
+                </a:tc>
+                <a:tc>
+                  <a:txBody>
+                    <a:bodyPr/>
+                    <a:lstStyle/>
+                    <a:p>
+                      <a:r>
+                        <a:rPr lang="en-US" sz="1400" b="1" dirty="0">
+                          <a:solidFill>
+                            <a:schemeClr val="tx1">
+                              <a:lumMod val="85000"/>
+                              <a:lumOff val="15000"/>
+                            </a:schemeClr>
+                          </a:solidFill>
+                          <a:latin typeface="Roboto Condensed" panose="02000000000000000000" pitchFamily="2" charset="0"/>
+                          <a:ea typeface="Roboto Condensed" panose="02000000000000000000" pitchFamily="2" charset="0"/>
+                        </a:rPr>
+                        <a:t>Ensure cross-cultural sensitivity</a:t>
+                      </a:r>
+                    </a:p>
+                  </a:txBody>
+                  <a:tcPr/>
+                </a:tc>
+                <a:tc>
+                  <a:txBody>
+                    <a:bodyPr/>
+                    <a:lstStyle/>
+                    <a:p>
+                      <a:pPr marL="285750" indent="-285750">
+                        <a:spcAft>
+                          <a:spcPts val="600"/>
+                        </a:spcAft>
+                        <a:buFont typeface="Arial" panose="020B0604020202020204" pitchFamily="34" charset="0"/>
+                        <a:buChar char="•"/>
+                      </a:pPr>
+                      <a:r>
+                        <a:rPr lang="en-US" sz="1400" dirty="0">
+                          <a:solidFill>
+                            <a:schemeClr val="tx1">
+                              <a:lumMod val="85000"/>
+                              <a:lumOff val="15000"/>
+                            </a:schemeClr>
+                          </a:solidFill>
+                          <a:latin typeface="Roboto Condensed" panose="02000000000000000000" pitchFamily="2" charset="0"/>
+                          <a:ea typeface="Roboto Condensed" panose="02000000000000000000" pitchFamily="2" charset="0"/>
+                        </a:rPr>
+                        <a:t>Acknowledge and respect cultural differences in language and context, adapting text classification models to be sensitive to various cultural norms and nuances.</a:t>
+                      </a:r>
+                    </a:p>
+                  </a:txBody>
+                  <a:tcPr/>
+                </a:tc>
+                <a:extLst>
+                  <a:ext uri="{0D108BD9-81ED-4DB2-BD59-A6C34878D82A}">
+                    <a16:rowId xmlns:a16="http://schemas.microsoft.com/office/drawing/2014/main" val="2729821217"/>
+                  </a:ext>
+                </a:extLst>
+              </a:tr>
+              <a:tr h="370840">
+                <a:tc>
+                  <a:txBody>
+                    <a:bodyPr/>
+                    <a:lstStyle/>
+                    <a:p>
+                      <a:r>
+                        <a:rPr lang="en-US" sz="1400" dirty="0">
+                          <a:solidFill>
+                            <a:schemeClr val="tx1">
+                              <a:lumMod val="85000"/>
+                              <a:lumOff val="15000"/>
+                            </a:schemeClr>
+                          </a:solidFill>
+                          <a:latin typeface="Roboto Condensed" panose="02000000000000000000" pitchFamily="2" charset="0"/>
+                          <a:ea typeface="Roboto Condensed" panose="02000000000000000000" pitchFamily="2" charset="0"/>
+                        </a:rPr>
+                        <a:t>7. </a:t>
+                      </a:r>
+                    </a:p>
+                  </a:txBody>
+                  <a:tcPr/>
+                </a:tc>
+                <a:tc>
+                  <a:txBody>
+                    <a:bodyPr/>
+                    <a:lstStyle/>
+                    <a:p>
+                      <a:r>
+                        <a:rPr lang="en-US" sz="1400" b="1" dirty="0">
+                          <a:solidFill>
+                            <a:schemeClr val="tx1">
+                              <a:lumMod val="85000"/>
+                              <a:lumOff val="15000"/>
+                            </a:schemeClr>
+                          </a:solidFill>
+                          <a:latin typeface="Roboto Condensed" panose="02000000000000000000" pitchFamily="2" charset="0"/>
+                          <a:ea typeface="Roboto Condensed" panose="02000000000000000000" pitchFamily="2" charset="0"/>
+                        </a:rPr>
+                        <a:t>Engage with peers, subjects, community and stakeholders</a:t>
+                      </a:r>
+                    </a:p>
+                  </a:txBody>
+                  <a:tcPr/>
+                </a:tc>
+                <a:tc>
+                  <a:txBody>
+                    <a:bodyPr/>
+                    <a:lstStyle/>
+                    <a:p>
+                      <a:pPr marL="285750" indent="-285750">
+                        <a:spcAft>
+                          <a:spcPts val="600"/>
+                        </a:spcAft>
+                        <a:buFont typeface="Arial" panose="020B0604020202020204" pitchFamily="34" charset="0"/>
+                        <a:buChar char="•"/>
+                      </a:pPr>
+                      <a:r>
+                        <a:rPr lang="en-US" sz="1400" dirty="0">
+                          <a:solidFill>
+                            <a:schemeClr val="tx1">
+                              <a:lumMod val="85000"/>
+                              <a:lumOff val="15000"/>
+                            </a:schemeClr>
+                          </a:solidFill>
+                          <a:latin typeface="Roboto Condensed" panose="02000000000000000000" pitchFamily="2" charset="0"/>
+                          <a:ea typeface="Roboto Condensed" panose="02000000000000000000" pitchFamily="2" charset="0"/>
+                        </a:rPr>
+                        <a:t>Engage with relevant communities and stakeholders to gather feedback, understand concerns, and involve them in shaping the development and application of text classification methods.</a:t>
+                      </a:r>
+                    </a:p>
+                  </a:txBody>
+                  <a:tcPr/>
+                </a:tc>
+                <a:extLst>
+                  <a:ext uri="{0D108BD9-81ED-4DB2-BD59-A6C34878D82A}">
+                    <a16:rowId xmlns:a16="http://schemas.microsoft.com/office/drawing/2014/main" val="4029400300"/>
+                  </a:ext>
+                </a:extLst>
+              </a:tr>
+            </a:tbl>
+          </a:graphicData>
+        </a:graphic>
+      </p:graphicFrame>
+    </p:spTree>
+    <p:extLst>
+      <p:ext uri="{BB962C8B-B14F-4D97-AF65-F5344CB8AC3E}">
+        <p14:creationId xmlns:p14="http://schemas.microsoft.com/office/powerpoint/2010/main" val="4206989999"/>
+      </p:ext>
+    </p:extLst>
+  </p:cSld>
+  <p:clrMapOvr>
+    <a:masterClrMapping/>
+  </p:clrMapOvr>
+</p:sld>
+</file>
+
 <file path=ppt/theme/theme1.xml><?xml version="1.0" encoding="utf-8"?>
 <a:theme xmlns:a="http://schemas.openxmlformats.org/drawingml/2006/main" name="Office Theme">
   <a:themeElements>

</xml_diff>